<commit_message>
:memo: Update PPT Template (.pptx)
</commit_message>
<xml_diff>
--- a/Templates/ROBIT_REPORT_PPT_TEMPLATE.pptx
+++ b/Templates/ROBIT_REPORT_PPT_TEMPLATE.pptx
@@ -114,6 +114,11 @@
       </a:defRPr>
     </a:lvl9pPr>
   </p:defaultTextStyle>
+  <p:extLst>
+    <p:ext uri="{EFAFB233-063F-42B5-8137-9DF3F51BA10A}">
+      <p15:sldGuideLst xmlns:p15="http://schemas.microsoft.com/office/powerpoint/2012/main"/>
+    </p:ext>
+  </p:extLst>
 </p:presentation>
 </file>
 
@@ -285,7 +290,7 @@
           <a:p>
             <a:fld id="{89A6ECC6-FDDA-4013-8A7A-C99132F3B33E}" type="datetimeFigureOut">
               <a:rPr lang="ko-KR" altLang="en-US" smtClean="0"/>
-              <a:t>2024-08-03</a:t>
+              <a:t>2024-08-04</a:t>
             </a:fld>
             <a:endParaRPr lang="ko-KR" altLang="en-US"/>
           </a:p>
@@ -342,6 +347,58 @@
               <a:t>‹#›</a:t>
             </a:fld>
             <a:endParaRPr lang="ko-KR" altLang="en-US"/>
+          </a:p>
+        </p:txBody>
+      </p:sp>
+      <p:sp>
+        <p:nvSpPr>
+          <p:cNvPr id="8" name="직사각형 7">
+            <a:extLst>
+              <a:ext uri="{FF2B5EF4-FFF2-40B4-BE49-F238E27FC236}">
+                <a16:creationId xmlns:a16="http://schemas.microsoft.com/office/drawing/2014/main" id="{F669C114-0311-ADF8-8863-C9131BA5952C}"/>
+              </a:ext>
+            </a:extLst>
+          </p:cNvPr>
+          <p:cNvSpPr/>
+          <p:nvPr userDrawn="1"/>
+        </p:nvSpPr>
+        <p:spPr>
+          <a:xfrm>
+            <a:off x="3756000" y="3520000"/>
+            <a:ext cx="4680000" cy="72000"/>
+          </a:xfrm>
+          <a:prstGeom prst="rect">
+            <a:avLst/>
+          </a:prstGeom>
+          <a:solidFill>
+            <a:srgbClr val="781D2C"/>
+          </a:solidFill>
+          <a:ln>
+            <a:noFill/>
+          </a:ln>
+        </p:spPr>
+        <p:style>
+          <a:lnRef idx="2">
+            <a:schemeClr val="accent1">
+              <a:shade val="15000"/>
+            </a:schemeClr>
+          </a:lnRef>
+          <a:fillRef idx="1">
+            <a:schemeClr val="accent1"/>
+          </a:fillRef>
+          <a:effectRef idx="0">
+            <a:schemeClr val="accent1"/>
+          </a:effectRef>
+          <a:fontRef idx="minor">
+            <a:schemeClr val="lt1"/>
+          </a:fontRef>
+        </p:style>
+        <p:txBody>
+          <a:bodyPr rtlCol="0" anchor="ctr"/>
+          <a:lstStyle/>
+          <a:p>
+            <a:pPr algn="ctr"/>
+            <a:endParaRPr lang="ko-KR" altLang="en-US" dirty="0"/>
           </a:p>
         </p:txBody>
       </p:sp>
@@ -359,6 +416,294 @@
 </file>
 
 <file path=ppt/slideLayouts/slideLayout10.xml><?xml version="1.0" encoding="utf-8"?>
+<p:sldLayout xmlns:a="http://schemas.openxmlformats.org/drawingml/2006/main" xmlns:r="http://schemas.openxmlformats.org/officeDocument/2006/relationships" xmlns:p="http://schemas.openxmlformats.org/presentationml/2006/main" type="picTx" preserve="1">
+  <p:cSld name="캡션 있는 그림">
+    <p:spTree>
+      <p:nvGrpSpPr>
+        <p:cNvPr id="1" name=""/>
+        <p:cNvGrpSpPr/>
+        <p:nvPr/>
+      </p:nvGrpSpPr>
+      <p:grpSpPr>
+        <a:xfrm>
+          <a:off x="0" y="0"/>
+          <a:ext cx="0" cy="0"/>
+          <a:chOff x="0" y="0"/>
+          <a:chExt cx="0" cy="0"/>
+        </a:xfrm>
+      </p:grpSpPr>
+      <p:sp>
+        <p:nvSpPr>
+          <p:cNvPr id="2" name="제목 1">
+            <a:extLst>
+              <a:ext uri="{FF2B5EF4-FFF2-40B4-BE49-F238E27FC236}">
+                <a16:creationId xmlns:a16="http://schemas.microsoft.com/office/drawing/2014/main" id="{36D13963-C359-BDA2-1245-4F0527B7BDD8}"/>
+              </a:ext>
+            </a:extLst>
+          </p:cNvPr>
+          <p:cNvSpPr>
+            <a:spLocks noGrp="1"/>
+          </p:cNvSpPr>
+          <p:nvPr>
+            <p:ph type="title"/>
+          </p:nvPr>
+        </p:nvSpPr>
+        <p:spPr>
+          <a:xfrm>
+            <a:off x="839788" y="457200"/>
+            <a:ext cx="3932237" cy="1600200"/>
+          </a:xfrm>
+        </p:spPr>
+        <p:txBody>
+          <a:bodyPr anchor="b"/>
+          <a:lstStyle>
+            <a:lvl1pPr>
+              <a:defRPr sz="3200"/>
+            </a:lvl1pPr>
+          </a:lstStyle>
+          <a:p>
+            <a:r>
+              <a:rPr lang="ko-KR" altLang="en-US"/>
+              <a:t>마스터 제목 스타일 편집</a:t>
+            </a:r>
+          </a:p>
+        </p:txBody>
+      </p:sp>
+      <p:sp>
+        <p:nvSpPr>
+          <p:cNvPr id="3" name="그림 개체 틀 2">
+            <a:extLst>
+              <a:ext uri="{FF2B5EF4-FFF2-40B4-BE49-F238E27FC236}">
+                <a16:creationId xmlns:a16="http://schemas.microsoft.com/office/drawing/2014/main" id="{986C31F9-3A2A-2391-76F1-D9DA129FB189}"/>
+              </a:ext>
+            </a:extLst>
+          </p:cNvPr>
+          <p:cNvSpPr>
+            <a:spLocks noGrp="1"/>
+          </p:cNvSpPr>
+          <p:nvPr>
+            <p:ph type="pic" idx="1"/>
+          </p:nvPr>
+        </p:nvSpPr>
+        <p:spPr>
+          <a:xfrm>
+            <a:off x="5183188" y="987425"/>
+            <a:ext cx="6172200" cy="4873625"/>
+          </a:xfrm>
+        </p:spPr>
+        <p:txBody>
+          <a:bodyPr/>
+          <a:lstStyle>
+            <a:lvl1pPr marL="0" indent="0">
+              <a:buNone/>
+              <a:defRPr sz="3200"/>
+            </a:lvl1pPr>
+            <a:lvl2pPr marL="457200" indent="0">
+              <a:buNone/>
+              <a:defRPr sz="2800"/>
+            </a:lvl2pPr>
+            <a:lvl3pPr marL="914400" indent="0">
+              <a:buNone/>
+              <a:defRPr sz="2400"/>
+            </a:lvl3pPr>
+            <a:lvl4pPr marL="1371600" indent="0">
+              <a:buNone/>
+              <a:defRPr sz="2000"/>
+            </a:lvl4pPr>
+            <a:lvl5pPr marL="1828800" indent="0">
+              <a:buNone/>
+              <a:defRPr sz="2000"/>
+            </a:lvl5pPr>
+            <a:lvl6pPr marL="2286000" indent="0">
+              <a:buNone/>
+              <a:defRPr sz="2000"/>
+            </a:lvl6pPr>
+            <a:lvl7pPr marL="2743200" indent="0">
+              <a:buNone/>
+              <a:defRPr sz="2000"/>
+            </a:lvl7pPr>
+            <a:lvl8pPr marL="3200400" indent="0">
+              <a:buNone/>
+              <a:defRPr sz="2000"/>
+            </a:lvl8pPr>
+            <a:lvl9pPr marL="3657600" indent="0">
+              <a:buNone/>
+              <a:defRPr sz="2000"/>
+            </a:lvl9pPr>
+          </a:lstStyle>
+          <a:p>
+            <a:endParaRPr lang="ko-KR" altLang="en-US"/>
+          </a:p>
+        </p:txBody>
+      </p:sp>
+      <p:sp>
+        <p:nvSpPr>
+          <p:cNvPr id="4" name="텍스트 개체 틀 3">
+            <a:extLst>
+              <a:ext uri="{FF2B5EF4-FFF2-40B4-BE49-F238E27FC236}">
+                <a16:creationId xmlns:a16="http://schemas.microsoft.com/office/drawing/2014/main" id="{14B52774-3348-7934-CE6B-562631011540}"/>
+              </a:ext>
+            </a:extLst>
+          </p:cNvPr>
+          <p:cNvSpPr>
+            <a:spLocks noGrp="1"/>
+          </p:cNvSpPr>
+          <p:nvPr>
+            <p:ph type="body" sz="half" idx="2"/>
+          </p:nvPr>
+        </p:nvSpPr>
+        <p:spPr>
+          <a:xfrm>
+            <a:off x="839788" y="2057400"/>
+            <a:ext cx="3932237" cy="3811588"/>
+          </a:xfrm>
+        </p:spPr>
+        <p:txBody>
+          <a:bodyPr/>
+          <a:lstStyle>
+            <a:lvl1pPr marL="0" indent="0">
+              <a:buNone/>
+              <a:defRPr sz="1600"/>
+            </a:lvl1pPr>
+            <a:lvl2pPr marL="457200" indent="0">
+              <a:buNone/>
+              <a:defRPr sz="1400"/>
+            </a:lvl2pPr>
+            <a:lvl3pPr marL="914400" indent="0">
+              <a:buNone/>
+              <a:defRPr sz="1200"/>
+            </a:lvl3pPr>
+            <a:lvl4pPr marL="1371600" indent="0">
+              <a:buNone/>
+              <a:defRPr sz="1000"/>
+            </a:lvl4pPr>
+            <a:lvl5pPr marL="1828800" indent="0">
+              <a:buNone/>
+              <a:defRPr sz="1000"/>
+            </a:lvl5pPr>
+            <a:lvl6pPr marL="2286000" indent="0">
+              <a:buNone/>
+              <a:defRPr sz="1000"/>
+            </a:lvl6pPr>
+            <a:lvl7pPr marL="2743200" indent="0">
+              <a:buNone/>
+              <a:defRPr sz="1000"/>
+            </a:lvl7pPr>
+            <a:lvl8pPr marL="3200400" indent="0">
+              <a:buNone/>
+              <a:defRPr sz="1000"/>
+            </a:lvl8pPr>
+            <a:lvl9pPr marL="3657600" indent="0">
+              <a:buNone/>
+              <a:defRPr sz="1000"/>
+            </a:lvl9pPr>
+          </a:lstStyle>
+          <a:p>
+            <a:pPr lvl="0"/>
+            <a:r>
+              <a:rPr lang="ko-KR" altLang="en-US"/>
+              <a:t>마스터 텍스트 스타일을 편집하려면 클릭</a:t>
+            </a:r>
+          </a:p>
+        </p:txBody>
+      </p:sp>
+      <p:sp>
+        <p:nvSpPr>
+          <p:cNvPr id="5" name="날짜 개체 틀 4">
+            <a:extLst>
+              <a:ext uri="{FF2B5EF4-FFF2-40B4-BE49-F238E27FC236}">
+                <a16:creationId xmlns:a16="http://schemas.microsoft.com/office/drawing/2014/main" id="{3A35A306-CF6B-2035-ACB3-449DBD27EB37}"/>
+              </a:ext>
+            </a:extLst>
+          </p:cNvPr>
+          <p:cNvSpPr>
+            <a:spLocks noGrp="1"/>
+          </p:cNvSpPr>
+          <p:nvPr>
+            <p:ph type="dt" sz="half" idx="10"/>
+          </p:nvPr>
+        </p:nvSpPr>
+        <p:spPr/>
+        <p:txBody>
+          <a:bodyPr/>
+          <a:lstStyle/>
+          <a:p>
+            <a:fld id="{89A6ECC6-FDDA-4013-8A7A-C99132F3B33E}" type="datetimeFigureOut">
+              <a:rPr lang="ko-KR" altLang="en-US" smtClean="0"/>
+              <a:t>2024-08-04</a:t>
+            </a:fld>
+            <a:endParaRPr lang="ko-KR" altLang="en-US"/>
+          </a:p>
+        </p:txBody>
+      </p:sp>
+      <p:sp>
+        <p:nvSpPr>
+          <p:cNvPr id="6" name="바닥글 개체 틀 5">
+            <a:extLst>
+              <a:ext uri="{FF2B5EF4-FFF2-40B4-BE49-F238E27FC236}">
+                <a16:creationId xmlns:a16="http://schemas.microsoft.com/office/drawing/2014/main" id="{E5C5E1B7-87D4-EDC1-6E8B-B6322524FCE0}"/>
+              </a:ext>
+            </a:extLst>
+          </p:cNvPr>
+          <p:cNvSpPr>
+            <a:spLocks noGrp="1"/>
+          </p:cNvSpPr>
+          <p:nvPr>
+            <p:ph type="ftr" sz="quarter" idx="11"/>
+          </p:nvPr>
+        </p:nvSpPr>
+        <p:spPr/>
+        <p:txBody>
+          <a:bodyPr/>
+          <a:lstStyle/>
+          <a:p>
+            <a:endParaRPr lang="ko-KR" altLang="en-US"/>
+          </a:p>
+        </p:txBody>
+      </p:sp>
+      <p:sp>
+        <p:nvSpPr>
+          <p:cNvPr id="7" name="슬라이드 번호 개체 틀 6">
+            <a:extLst>
+              <a:ext uri="{FF2B5EF4-FFF2-40B4-BE49-F238E27FC236}">
+                <a16:creationId xmlns:a16="http://schemas.microsoft.com/office/drawing/2014/main" id="{20A4EDF3-3092-4C14-F9DB-0C784E288F19}"/>
+              </a:ext>
+            </a:extLst>
+          </p:cNvPr>
+          <p:cNvSpPr>
+            <a:spLocks noGrp="1"/>
+          </p:cNvSpPr>
+          <p:nvPr>
+            <p:ph type="sldNum" sz="quarter" idx="12"/>
+          </p:nvPr>
+        </p:nvSpPr>
+        <p:spPr/>
+        <p:txBody>
+          <a:bodyPr/>
+          <a:lstStyle/>
+          <a:p>
+            <a:fld id="{8BB06AED-F636-4F75-B2CC-55ED5FB6B1EF}" type="slidenum">
+              <a:rPr lang="ko-KR" altLang="en-US" smtClean="0"/>
+              <a:t>‹#›</a:t>
+            </a:fld>
+            <a:endParaRPr lang="ko-KR" altLang="en-US"/>
+          </a:p>
+        </p:txBody>
+      </p:sp>
+    </p:spTree>
+    <p:extLst>
+      <p:ext uri="{BB962C8B-B14F-4D97-AF65-F5344CB8AC3E}">
+        <p14:creationId xmlns:p14="http://schemas.microsoft.com/office/powerpoint/2010/main" val="732431397"/>
+      </p:ext>
+    </p:extLst>
+  </p:cSld>
+  <p:clrMapOvr>
+    <a:masterClrMapping/>
+  </p:clrMapOvr>
+</p:sldLayout>
+</file>
+
+<file path=ppt/slideLayouts/slideLayout11.xml><?xml version="1.0" encoding="utf-8"?>
 <p:sldLayout xmlns:a="http://schemas.openxmlformats.org/drawingml/2006/main" xmlns:r="http://schemas.openxmlformats.org/officeDocument/2006/relationships" xmlns:p="http://schemas.openxmlformats.org/presentationml/2006/main" type="vertTx" preserve="1">
   <p:cSld name="제목 및 세로 텍스트">
     <p:spTree>
@@ -483,7 +828,7 @@
           <a:p>
             <a:fld id="{89A6ECC6-FDDA-4013-8A7A-C99132F3B33E}" type="datetimeFigureOut">
               <a:rPr lang="ko-KR" altLang="en-US" smtClean="0"/>
-              <a:t>2024-08-03</a:t>
+              <a:t>2024-08-04</a:t>
             </a:fld>
             <a:endParaRPr lang="ko-KR" altLang="en-US"/>
           </a:p>
@@ -556,7 +901,7 @@
 </p:sldLayout>
 </file>
 
-<file path=ppt/slideLayouts/slideLayout11.xml><?xml version="1.0" encoding="utf-8"?>
+<file path=ppt/slideLayouts/slideLayout12.xml><?xml version="1.0" encoding="utf-8"?>
 <p:sldLayout xmlns:a="http://schemas.openxmlformats.org/drawingml/2006/main" xmlns:r="http://schemas.openxmlformats.org/officeDocument/2006/relationships" xmlns:p="http://schemas.openxmlformats.org/presentationml/2006/main" type="vertTitleAndTx" preserve="1">
   <p:cSld name="세로 제목 및 텍스트">
     <p:spTree>
@@ -691,7 +1036,7 @@
           <a:p>
             <a:fld id="{89A6ECC6-FDDA-4013-8A7A-C99132F3B33E}" type="datetimeFigureOut">
               <a:rPr lang="ko-KR" altLang="en-US" smtClean="0"/>
-              <a:t>2024-08-03</a:t>
+              <a:t>2024-08-04</a:t>
             </a:fld>
             <a:endParaRPr lang="ko-KR" altLang="en-US"/>
           </a:p>
@@ -889,7 +1234,7 @@
           <a:p>
             <a:fld id="{89A6ECC6-FDDA-4013-8A7A-C99132F3B33E}" type="datetimeFigureOut">
               <a:rPr lang="ko-KR" altLang="en-US" smtClean="0"/>
-              <a:t>2024-08-03</a:t>
+              <a:t>2024-08-04</a:t>
             </a:fld>
             <a:endParaRPr lang="ko-KR" altLang="en-US"/>
           </a:p>
@@ -1015,8 +1360,8 @@
 </file>
 
 <file path=ppt/slideLayouts/slideLayout3.xml><?xml version="1.0" encoding="utf-8"?>
-<p:sldLayout xmlns:a="http://schemas.openxmlformats.org/drawingml/2006/main" xmlns:r="http://schemas.openxmlformats.org/officeDocument/2006/relationships" xmlns:p="http://schemas.openxmlformats.org/presentationml/2006/main" type="secHead" preserve="1">
-  <p:cSld name="구역 머리글">
+<p:sldLayout xmlns:a="http://schemas.openxmlformats.org/drawingml/2006/main" xmlns:r="http://schemas.openxmlformats.org/officeDocument/2006/relationships" xmlns:p="http://schemas.openxmlformats.org/presentationml/2006/main" preserve="1" userDrawn="1">
+  <p:cSld name="1_구역 머리글">
     <p:spTree>
       <p:nvGrpSpPr>
         <p:cNvPr id="1" name=""/>
@@ -1033,6 +1378,58 @@
       </p:grpSpPr>
       <p:sp>
         <p:nvSpPr>
+          <p:cNvPr id="7" name="직사각형 6">
+            <a:extLst>
+              <a:ext uri="{FF2B5EF4-FFF2-40B4-BE49-F238E27FC236}">
+                <a16:creationId xmlns:a16="http://schemas.microsoft.com/office/drawing/2014/main" id="{B376A17A-E37C-FEFF-3D77-C9FE04EF966D}"/>
+              </a:ext>
+            </a:extLst>
+          </p:cNvPr>
+          <p:cNvSpPr/>
+          <p:nvPr userDrawn="1"/>
+        </p:nvSpPr>
+        <p:spPr>
+          <a:xfrm>
+            <a:off x="831850" y="1709738"/>
+            <a:ext cx="10515600" cy="2852737"/>
+          </a:xfrm>
+          <a:prstGeom prst="rect">
+            <a:avLst/>
+          </a:prstGeom>
+          <a:solidFill>
+            <a:srgbClr val="781D2C"/>
+          </a:solidFill>
+          <a:ln>
+            <a:noFill/>
+          </a:ln>
+        </p:spPr>
+        <p:style>
+          <a:lnRef idx="2">
+            <a:schemeClr val="accent1">
+              <a:shade val="15000"/>
+            </a:schemeClr>
+          </a:lnRef>
+          <a:fillRef idx="1">
+            <a:schemeClr val="accent1"/>
+          </a:fillRef>
+          <a:effectRef idx="0">
+            <a:schemeClr val="accent1"/>
+          </a:effectRef>
+          <a:fontRef idx="minor">
+            <a:schemeClr val="lt1"/>
+          </a:fontRef>
+        </p:style>
+        <p:txBody>
+          <a:bodyPr rtlCol="0" anchor="ctr"/>
+          <a:lstStyle/>
+          <a:p>
+            <a:pPr algn="ctr"/>
+            <a:endParaRPr lang="ko-KR" altLang="en-US"/>
+          </a:p>
+        </p:txBody>
+      </p:sp>
+      <p:sp>
+        <p:nvSpPr>
           <p:cNvPr id="2" name="제목 1">
             <a:extLst>
               <a:ext uri="{FF2B5EF4-FFF2-40B4-BE49-F238E27FC236}">
@@ -1054,141 +1451,20 @@
           </a:xfrm>
         </p:spPr>
         <p:txBody>
-          <a:bodyPr anchor="b"/>
+          <a:bodyPr anchor="ctr"/>
           <a:lstStyle>
-            <a:lvl1pPr>
-              <a:defRPr sz="6000"/>
-            </a:lvl1pPr>
-          </a:lstStyle>
-          <a:p>
-            <a:r>
-              <a:rPr lang="ko-KR" altLang="en-US"/>
-              <a:t>마스터 제목 스타일 편집</a:t>
-            </a:r>
-          </a:p>
-        </p:txBody>
-      </p:sp>
-      <p:sp>
-        <p:nvSpPr>
-          <p:cNvPr id="3" name="텍스트 개체 틀 2">
-            <a:extLst>
-              <a:ext uri="{FF2B5EF4-FFF2-40B4-BE49-F238E27FC236}">
-                <a16:creationId xmlns:a16="http://schemas.microsoft.com/office/drawing/2014/main" id="{9F1DD081-0665-96D7-1B9C-C96F0C6A6CAF}"/>
-              </a:ext>
-            </a:extLst>
-          </p:cNvPr>
-          <p:cNvSpPr>
-            <a:spLocks noGrp="1"/>
-          </p:cNvSpPr>
-          <p:nvPr>
-            <p:ph type="body" idx="1"/>
-          </p:nvPr>
-        </p:nvSpPr>
-        <p:spPr>
-          <a:xfrm>
-            <a:off x="831850" y="4589463"/>
-            <a:ext cx="10515600" cy="1500187"/>
-          </a:xfrm>
-        </p:spPr>
-        <p:txBody>
-          <a:bodyPr/>
-          <a:lstStyle>
-            <a:lvl1pPr marL="0" indent="0">
-              <a:buNone/>
-              <a:defRPr sz="2400">
+            <a:lvl1pPr algn="ctr">
+              <a:defRPr sz="6000">
                 <a:solidFill>
-                  <a:schemeClr val="tx1">
-                    <a:tint val="82000"/>
-                  </a:schemeClr>
+                  <a:schemeClr val="bg1"/>
                 </a:solidFill>
               </a:defRPr>
             </a:lvl1pPr>
-            <a:lvl2pPr marL="457200" indent="0">
-              <a:buNone/>
-              <a:defRPr sz="2000">
-                <a:solidFill>
-                  <a:schemeClr val="tx1">
-                    <a:tint val="82000"/>
-                  </a:schemeClr>
-                </a:solidFill>
-              </a:defRPr>
-            </a:lvl2pPr>
-            <a:lvl3pPr marL="914400" indent="0">
-              <a:buNone/>
-              <a:defRPr sz="1800">
-                <a:solidFill>
-                  <a:schemeClr val="tx1">
-                    <a:tint val="82000"/>
-                  </a:schemeClr>
-                </a:solidFill>
-              </a:defRPr>
-            </a:lvl3pPr>
-            <a:lvl4pPr marL="1371600" indent="0">
-              <a:buNone/>
-              <a:defRPr sz="1600">
-                <a:solidFill>
-                  <a:schemeClr val="tx1">
-                    <a:tint val="82000"/>
-                  </a:schemeClr>
-                </a:solidFill>
-              </a:defRPr>
-            </a:lvl4pPr>
-            <a:lvl5pPr marL="1828800" indent="0">
-              <a:buNone/>
-              <a:defRPr sz="1600">
-                <a:solidFill>
-                  <a:schemeClr val="tx1">
-                    <a:tint val="82000"/>
-                  </a:schemeClr>
-                </a:solidFill>
-              </a:defRPr>
-            </a:lvl5pPr>
-            <a:lvl6pPr marL="2286000" indent="0">
-              <a:buNone/>
-              <a:defRPr sz="1600">
-                <a:solidFill>
-                  <a:schemeClr val="tx1">
-                    <a:tint val="82000"/>
-                  </a:schemeClr>
-                </a:solidFill>
-              </a:defRPr>
-            </a:lvl6pPr>
-            <a:lvl7pPr marL="2743200" indent="0">
-              <a:buNone/>
-              <a:defRPr sz="1600">
-                <a:solidFill>
-                  <a:schemeClr val="tx1">
-                    <a:tint val="82000"/>
-                  </a:schemeClr>
-                </a:solidFill>
-              </a:defRPr>
-            </a:lvl7pPr>
-            <a:lvl8pPr marL="3200400" indent="0">
-              <a:buNone/>
-              <a:defRPr sz="1600">
-                <a:solidFill>
-                  <a:schemeClr val="tx1">
-                    <a:tint val="82000"/>
-                  </a:schemeClr>
-                </a:solidFill>
-              </a:defRPr>
-            </a:lvl8pPr>
-            <a:lvl9pPr marL="3657600" indent="0">
-              <a:buNone/>
-              <a:defRPr sz="1600">
-                <a:solidFill>
-                  <a:schemeClr val="tx1">
-                    <a:tint val="82000"/>
-                  </a:schemeClr>
-                </a:solidFill>
-              </a:defRPr>
-            </a:lvl9pPr>
           </a:lstStyle>
           <a:p>
-            <a:pPr lvl="0"/>
-            <a:r>
-              <a:rPr lang="ko-KR" altLang="en-US"/>
-              <a:t>마스터 텍스트 스타일을 편집하려면 클릭</a:t>
+            <a:r>
+              <a:rPr lang="ko-KR" altLang="en-US" dirty="0"/>
+              <a:t>마스터 제목 스타일 편집</a:t>
             </a:r>
           </a:p>
         </p:txBody>
@@ -1216,7 +1492,7 @@
           <a:p>
             <a:fld id="{89A6ECC6-FDDA-4013-8A7A-C99132F3B33E}" type="datetimeFigureOut">
               <a:rPr lang="ko-KR" altLang="en-US" smtClean="0"/>
-              <a:t>2024-08-03</a:t>
+              <a:t>2024-08-04</a:t>
             </a:fld>
             <a:endParaRPr lang="ko-KR" altLang="en-US"/>
           </a:p>
@@ -1279,7 +1555,7 @@
     </p:spTree>
     <p:extLst>
       <p:ext uri="{BB962C8B-B14F-4D97-AF65-F5344CB8AC3E}">
-        <p14:creationId xmlns:p14="http://schemas.microsoft.com/office/powerpoint/2010/main" val="2481662016"/>
+        <p14:creationId xmlns:p14="http://schemas.microsoft.com/office/powerpoint/2010/main" val="1185617907"/>
       </p:ext>
     </p:extLst>
   </p:cSld>
@@ -1290,6 +1566,264 @@
 </file>
 
 <file path=ppt/slideLayouts/slideLayout4.xml><?xml version="1.0" encoding="utf-8"?>
+<p:sldLayout xmlns:a="http://schemas.openxmlformats.org/drawingml/2006/main" xmlns:r="http://schemas.openxmlformats.org/officeDocument/2006/relationships" xmlns:p="http://schemas.openxmlformats.org/presentationml/2006/main" preserve="1" userDrawn="1">
+  <p:cSld name="2_구역 머리글">
+    <p:spTree>
+      <p:nvGrpSpPr>
+        <p:cNvPr id="1" name=""/>
+        <p:cNvGrpSpPr/>
+        <p:nvPr/>
+      </p:nvGrpSpPr>
+      <p:grpSpPr>
+        <a:xfrm>
+          <a:off x="0" y="0"/>
+          <a:ext cx="0" cy="0"/>
+          <a:chOff x="0" y="0"/>
+          <a:chExt cx="0" cy="0"/>
+        </a:xfrm>
+      </p:grpSpPr>
+      <p:sp>
+        <p:nvSpPr>
+          <p:cNvPr id="4" name="날짜 개체 틀 3">
+            <a:extLst>
+              <a:ext uri="{FF2B5EF4-FFF2-40B4-BE49-F238E27FC236}">
+                <a16:creationId xmlns:a16="http://schemas.microsoft.com/office/drawing/2014/main" id="{9A56517D-750A-402E-6A08-70782372344F}"/>
+              </a:ext>
+            </a:extLst>
+          </p:cNvPr>
+          <p:cNvSpPr>
+            <a:spLocks noGrp="1"/>
+          </p:cNvSpPr>
+          <p:nvPr>
+            <p:ph type="dt" sz="half" idx="10"/>
+          </p:nvPr>
+        </p:nvSpPr>
+        <p:spPr/>
+        <p:txBody>
+          <a:bodyPr/>
+          <a:lstStyle/>
+          <a:p>
+            <a:fld id="{89A6ECC6-FDDA-4013-8A7A-C99132F3B33E}" type="datetimeFigureOut">
+              <a:rPr lang="ko-KR" altLang="en-US" smtClean="0"/>
+              <a:t>2024-08-04</a:t>
+            </a:fld>
+            <a:endParaRPr lang="ko-KR" altLang="en-US"/>
+          </a:p>
+        </p:txBody>
+      </p:sp>
+      <p:sp>
+        <p:nvSpPr>
+          <p:cNvPr id="5" name="바닥글 개체 틀 4">
+            <a:extLst>
+              <a:ext uri="{FF2B5EF4-FFF2-40B4-BE49-F238E27FC236}">
+                <a16:creationId xmlns:a16="http://schemas.microsoft.com/office/drawing/2014/main" id="{1DDEB984-AF46-6BB9-3E2C-2E267DBD89EA}"/>
+              </a:ext>
+            </a:extLst>
+          </p:cNvPr>
+          <p:cNvSpPr>
+            <a:spLocks noGrp="1"/>
+          </p:cNvSpPr>
+          <p:nvPr>
+            <p:ph type="ftr" sz="quarter" idx="11"/>
+          </p:nvPr>
+        </p:nvSpPr>
+        <p:spPr/>
+        <p:txBody>
+          <a:bodyPr/>
+          <a:lstStyle/>
+          <a:p>
+            <a:endParaRPr lang="ko-KR" altLang="en-US"/>
+          </a:p>
+        </p:txBody>
+      </p:sp>
+      <p:sp>
+        <p:nvSpPr>
+          <p:cNvPr id="6" name="슬라이드 번호 개체 틀 5">
+            <a:extLst>
+              <a:ext uri="{FF2B5EF4-FFF2-40B4-BE49-F238E27FC236}">
+                <a16:creationId xmlns:a16="http://schemas.microsoft.com/office/drawing/2014/main" id="{7737E2AF-D3AD-5C6D-6085-086E3AF8D3D1}"/>
+              </a:ext>
+            </a:extLst>
+          </p:cNvPr>
+          <p:cNvSpPr>
+            <a:spLocks noGrp="1"/>
+          </p:cNvSpPr>
+          <p:nvPr>
+            <p:ph type="sldNum" sz="quarter" idx="12"/>
+          </p:nvPr>
+        </p:nvSpPr>
+        <p:spPr/>
+        <p:txBody>
+          <a:bodyPr/>
+          <a:lstStyle/>
+          <a:p>
+            <a:fld id="{8BB06AED-F636-4F75-B2CC-55ED5FB6B1EF}" type="slidenum">
+              <a:rPr lang="ko-KR" altLang="en-US" smtClean="0"/>
+              <a:t>‹#›</a:t>
+            </a:fld>
+            <a:endParaRPr lang="ko-KR" altLang="en-US"/>
+          </a:p>
+        </p:txBody>
+      </p:sp>
+      <p:pic>
+        <p:nvPicPr>
+          <p:cNvPr id="8" name="그림 7" descr="텍스트, 스크린샷, 자연이(가) 표시된 사진&#10;&#10;자동 생성된 설명">
+            <a:hlinkClick r:id="rId2"/>
+            <a:extLst>
+              <a:ext uri="{FF2B5EF4-FFF2-40B4-BE49-F238E27FC236}">
+                <a16:creationId xmlns:a16="http://schemas.microsoft.com/office/drawing/2014/main" id="{E1E88F93-B9A7-AC7F-0693-FF12CF0B191B}"/>
+              </a:ext>
+            </a:extLst>
+          </p:cNvPr>
+          <p:cNvPicPr>
+            <a:picLocks noChangeAspect="1"/>
+          </p:cNvPicPr>
+          <p:nvPr userDrawn="1"/>
+        </p:nvPicPr>
+        <p:blipFill>
+          <a:blip r:embed="rId3">
+            <a:extLst>
+              <a:ext uri="{28A0092B-C50C-407E-A947-70E740481C1C}">
+                <a14:useLocalDpi xmlns:a14="http://schemas.microsoft.com/office/drawing/2010/main" val="0"/>
+              </a:ext>
+            </a:extLst>
+          </a:blip>
+          <a:stretch>
+            <a:fillRect/>
+          </a:stretch>
+        </p:blipFill>
+        <p:spPr>
+          <a:xfrm>
+            <a:off x="2978727" y="2349179"/>
+            <a:ext cx="8885382" cy="2159641"/>
+          </a:xfrm>
+          <a:prstGeom prst="rect">
+            <a:avLst/>
+          </a:prstGeom>
+        </p:spPr>
+      </p:pic>
+      <p:sp>
+        <p:nvSpPr>
+          <p:cNvPr id="9" name="TextBox 8">
+            <a:extLst>
+              <a:ext uri="{FF2B5EF4-FFF2-40B4-BE49-F238E27FC236}">
+                <a16:creationId xmlns:a16="http://schemas.microsoft.com/office/drawing/2014/main" id="{0985CCE9-6C35-6EAD-ACA1-67387F7AEF1A}"/>
+              </a:ext>
+            </a:extLst>
+          </p:cNvPr>
+          <p:cNvSpPr txBox="1"/>
+          <p:nvPr userDrawn="1"/>
+        </p:nvSpPr>
+        <p:spPr>
+          <a:xfrm>
+            <a:off x="369455" y="136525"/>
+            <a:ext cx="2401454" cy="646331"/>
+          </a:xfrm>
+          <a:prstGeom prst="rect">
+            <a:avLst/>
+          </a:prstGeom>
+          <a:noFill/>
+        </p:spPr>
+        <p:txBody>
+          <a:bodyPr wrap="square" rtlCol="0" anchor="ctr">
+            <a:spAutoFit/>
+          </a:bodyPr>
+          <a:lstStyle/>
+          <a:p>
+            <a:r>
+              <a:rPr lang="en-US" altLang="ko-KR" sz="3600" dirty="0">
+                <a:latin typeface="Pretendard Black" panose="02000A03000000020004" pitchFamily="50" charset="-127"/>
+                <a:ea typeface="Pretendard Black" panose="02000A03000000020004" pitchFamily="50" charset="-127"/>
+                <a:cs typeface="Pretendard Black" panose="02000A03000000020004" pitchFamily="50" charset="-127"/>
+              </a:rPr>
+              <a:t>About Me</a:t>
+            </a:r>
+            <a:endParaRPr lang="ko-KR" altLang="en-US" sz="3600" dirty="0">
+              <a:latin typeface="Pretendard Black" panose="02000A03000000020004" pitchFamily="50" charset="-127"/>
+              <a:ea typeface="Pretendard Black" panose="02000A03000000020004" pitchFamily="50" charset="-127"/>
+              <a:cs typeface="Pretendard Black" panose="02000A03000000020004" pitchFamily="50" charset="-127"/>
+            </a:endParaRPr>
+          </a:p>
+        </p:txBody>
+      </p:sp>
+      <p:sp>
+        <p:nvSpPr>
+          <p:cNvPr id="10" name="TextBox 9">
+            <a:extLst>
+              <a:ext uri="{FF2B5EF4-FFF2-40B4-BE49-F238E27FC236}">
+                <a16:creationId xmlns:a16="http://schemas.microsoft.com/office/drawing/2014/main" id="{93F2C616-DB20-405B-41BE-00216FD4D013}"/>
+              </a:ext>
+            </a:extLst>
+          </p:cNvPr>
+          <p:cNvSpPr txBox="1"/>
+          <p:nvPr userDrawn="1"/>
+        </p:nvSpPr>
+        <p:spPr>
+          <a:xfrm>
+            <a:off x="369455" y="782856"/>
+            <a:ext cx="2179782" cy="923330"/>
+          </a:xfrm>
+          <a:prstGeom prst="rect">
+            <a:avLst/>
+          </a:prstGeom>
+          <a:noFill/>
+        </p:spPr>
+        <p:txBody>
+          <a:bodyPr wrap="square" rtlCol="0">
+            <a:spAutoFit/>
+          </a:bodyPr>
+          <a:lstStyle/>
+          <a:p>
+            <a:r>
+              <a:rPr lang="en-US" altLang="ko-KR" dirty="0" err="1">
+                <a:latin typeface="LINE Seed Sans KR Regular" panose="020B0603020203020204" pitchFamily="34" charset="-127"/>
+                <a:ea typeface="LINE Seed Sans KR Regular" panose="020B0603020203020204" pitchFamily="34" charset="-127"/>
+                <a:cs typeface="LINE Seed Sans KR Regular" panose="020B0603020203020204" pitchFamily="34" charset="-127"/>
+              </a:rPr>
+              <a:t>Datadoll</a:t>
+            </a:r>
+            <a:r>
+              <a:rPr lang="en-US" altLang="ko-KR" dirty="0">
+                <a:latin typeface="LINE Seed Sans KR Regular" panose="020B0603020203020204" pitchFamily="34" charset="-127"/>
+                <a:ea typeface="LINE Seed Sans KR Regular" panose="020B0603020203020204" pitchFamily="34" charset="-127"/>
+                <a:cs typeface="LINE Seed Sans KR Regular" panose="020B0603020203020204" pitchFamily="34" charset="-127"/>
+              </a:rPr>
+              <a:t> Studio</a:t>
+            </a:r>
+          </a:p>
+          <a:p>
+            <a:endParaRPr lang="en-US" altLang="ko-KR" dirty="0">
+              <a:latin typeface="LINE Seed Sans KR Regular" panose="020B0603020203020204" pitchFamily="34" charset="-127"/>
+              <a:ea typeface="LINE Seed Sans KR Regular" panose="020B0603020203020204" pitchFamily="34" charset="-127"/>
+              <a:cs typeface="LINE Seed Sans KR Regular" panose="020B0603020203020204" pitchFamily="34" charset="-127"/>
+            </a:endParaRPr>
+          </a:p>
+          <a:p>
+            <a:r>
+              <a:rPr lang="en-US" altLang="ko-KR" dirty="0">
+                <a:latin typeface="LINE Seed Sans KR Regular" panose="020B0603020203020204" pitchFamily="34" charset="-127"/>
+                <a:ea typeface="LINE Seed Sans KR Regular" panose="020B0603020203020204" pitchFamily="34" charset="-127"/>
+                <a:cs typeface="LINE Seed Sans KR Regular" panose="020B0603020203020204" pitchFamily="34" charset="-127"/>
+              </a:rPr>
+              <a:t>kh.park@kw.ac.kr</a:t>
+            </a:r>
+          </a:p>
+        </p:txBody>
+      </p:sp>
+    </p:spTree>
+    <p:extLst>
+      <p:ext uri="{BB962C8B-B14F-4D97-AF65-F5344CB8AC3E}">
+        <p14:creationId xmlns:p14="http://schemas.microsoft.com/office/powerpoint/2010/main" val="2744034433"/>
+      </p:ext>
+    </p:extLst>
+  </p:cSld>
+  <p:clrMapOvr>
+    <a:masterClrMapping/>
+  </p:clrMapOvr>
+</p:sldLayout>
+</file>
+
+<file path=ppt/slideLayouts/slideLayout5.xml><?xml version="1.0" encoding="utf-8"?>
 <p:sldLayout xmlns:a="http://schemas.openxmlformats.org/drawingml/2006/main" xmlns:r="http://schemas.openxmlformats.org/officeDocument/2006/relationships" xmlns:p="http://schemas.openxmlformats.org/presentationml/2006/main" type="twoObj" preserve="1">
   <p:cSld name="콘텐츠 2개">
     <p:spTree>
@@ -1481,7 +2015,7 @@
           <a:p>
             <a:fld id="{89A6ECC6-FDDA-4013-8A7A-C99132F3B33E}" type="datetimeFigureOut">
               <a:rPr lang="ko-KR" altLang="en-US" smtClean="0"/>
-              <a:t>2024-08-03</a:t>
+              <a:t>2024-08-04</a:t>
             </a:fld>
             <a:endParaRPr lang="ko-KR" altLang="en-US"/>
           </a:p>
@@ -1554,7 +2088,7 @@
 </p:sldLayout>
 </file>
 
-<file path=ppt/slideLayouts/slideLayout5.xml><?xml version="1.0" encoding="utf-8"?>
+<file path=ppt/slideLayouts/slideLayout6.xml><?xml version="1.0" encoding="utf-8"?>
 <p:sldLayout xmlns:a="http://schemas.openxmlformats.org/drawingml/2006/main" xmlns:r="http://schemas.openxmlformats.org/officeDocument/2006/relationships" xmlns:p="http://schemas.openxmlformats.org/presentationml/2006/main" type="twoTxTwoObj" preserve="1">
   <p:cSld name="비교">
     <p:spTree>
@@ -1893,7 +2427,7 @@
           <a:p>
             <a:fld id="{89A6ECC6-FDDA-4013-8A7A-C99132F3B33E}" type="datetimeFigureOut">
               <a:rPr lang="ko-KR" altLang="en-US" smtClean="0"/>
-              <a:t>2024-08-03</a:t>
+              <a:t>2024-08-04</a:t>
             </a:fld>
             <a:endParaRPr lang="ko-KR" altLang="en-US"/>
           </a:p>
@@ -1966,7 +2500,7 @@
 </p:sldLayout>
 </file>
 
-<file path=ppt/slideLayouts/slideLayout6.xml><?xml version="1.0" encoding="utf-8"?>
+<file path=ppt/slideLayouts/slideLayout7.xml><?xml version="1.0" encoding="utf-8"?>
 <p:sldLayout xmlns:a="http://schemas.openxmlformats.org/drawingml/2006/main" xmlns:r="http://schemas.openxmlformats.org/officeDocument/2006/relationships" xmlns:p="http://schemas.openxmlformats.org/presentationml/2006/main" type="titleOnly" preserve="1">
   <p:cSld name="제목만">
     <p:spTree>
@@ -2034,7 +2568,7 @@
           <a:p>
             <a:fld id="{89A6ECC6-FDDA-4013-8A7A-C99132F3B33E}" type="datetimeFigureOut">
               <a:rPr lang="ko-KR" altLang="en-US" smtClean="0"/>
-              <a:t>2024-08-03</a:t>
+              <a:t>2024-08-04</a:t>
             </a:fld>
             <a:endParaRPr lang="ko-KR" altLang="en-US"/>
           </a:p>
@@ -2107,7 +2641,7 @@
 </p:sldLayout>
 </file>
 
-<file path=ppt/slideLayouts/slideLayout7.xml><?xml version="1.0" encoding="utf-8"?>
+<file path=ppt/slideLayouts/slideLayout8.xml><?xml version="1.0" encoding="utf-8"?>
 <p:sldLayout xmlns:a="http://schemas.openxmlformats.org/drawingml/2006/main" xmlns:r="http://schemas.openxmlformats.org/officeDocument/2006/relationships" xmlns:p="http://schemas.openxmlformats.org/presentationml/2006/main" type="blank" preserve="1">
   <p:cSld name="빈 화면">
     <p:spTree>
@@ -2147,7 +2681,7 @@
           <a:p>
             <a:fld id="{89A6ECC6-FDDA-4013-8A7A-C99132F3B33E}" type="datetimeFigureOut">
               <a:rPr lang="ko-KR" altLang="en-US" smtClean="0"/>
-              <a:t>2024-08-03</a:t>
+              <a:t>2024-08-04</a:t>
             </a:fld>
             <a:endParaRPr lang="ko-KR" altLang="en-US"/>
           </a:p>
@@ -2220,7 +2754,7 @@
 </p:sldLayout>
 </file>
 
-<file path=ppt/slideLayouts/slideLayout8.xml><?xml version="1.0" encoding="utf-8"?>
+<file path=ppt/slideLayouts/slideLayout9.xml><?xml version="1.0" encoding="utf-8"?>
 <p:sldLayout xmlns:a="http://schemas.openxmlformats.org/drawingml/2006/main" xmlns:r="http://schemas.openxmlformats.org/officeDocument/2006/relationships" xmlns:p="http://schemas.openxmlformats.org/presentationml/2006/main" type="objTx" preserve="1">
   <p:cSld name="캡션 있는 콘텐츠">
     <p:spTree>
@@ -2458,7 +2992,7 @@
           <a:p>
             <a:fld id="{89A6ECC6-FDDA-4013-8A7A-C99132F3B33E}" type="datetimeFigureOut">
               <a:rPr lang="ko-KR" altLang="en-US" smtClean="0"/>
-              <a:t>2024-08-03</a:t>
+              <a:t>2024-08-04</a:t>
             </a:fld>
             <a:endParaRPr lang="ko-KR" altLang="en-US"/>
           </a:p>
@@ -2522,294 +3056,6 @@
     <p:extLst>
       <p:ext uri="{BB962C8B-B14F-4D97-AF65-F5344CB8AC3E}">
         <p14:creationId xmlns:p14="http://schemas.microsoft.com/office/powerpoint/2010/main" val="2561018077"/>
-      </p:ext>
-    </p:extLst>
-  </p:cSld>
-  <p:clrMapOvr>
-    <a:masterClrMapping/>
-  </p:clrMapOvr>
-</p:sldLayout>
-</file>
-
-<file path=ppt/slideLayouts/slideLayout9.xml><?xml version="1.0" encoding="utf-8"?>
-<p:sldLayout xmlns:a="http://schemas.openxmlformats.org/drawingml/2006/main" xmlns:r="http://schemas.openxmlformats.org/officeDocument/2006/relationships" xmlns:p="http://schemas.openxmlformats.org/presentationml/2006/main" type="picTx" preserve="1">
-  <p:cSld name="캡션 있는 그림">
-    <p:spTree>
-      <p:nvGrpSpPr>
-        <p:cNvPr id="1" name=""/>
-        <p:cNvGrpSpPr/>
-        <p:nvPr/>
-      </p:nvGrpSpPr>
-      <p:grpSpPr>
-        <a:xfrm>
-          <a:off x="0" y="0"/>
-          <a:ext cx="0" cy="0"/>
-          <a:chOff x="0" y="0"/>
-          <a:chExt cx="0" cy="0"/>
-        </a:xfrm>
-      </p:grpSpPr>
-      <p:sp>
-        <p:nvSpPr>
-          <p:cNvPr id="2" name="제목 1">
-            <a:extLst>
-              <a:ext uri="{FF2B5EF4-FFF2-40B4-BE49-F238E27FC236}">
-                <a16:creationId xmlns:a16="http://schemas.microsoft.com/office/drawing/2014/main" id="{36D13963-C359-BDA2-1245-4F0527B7BDD8}"/>
-              </a:ext>
-            </a:extLst>
-          </p:cNvPr>
-          <p:cNvSpPr>
-            <a:spLocks noGrp="1"/>
-          </p:cNvSpPr>
-          <p:nvPr>
-            <p:ph type="title"/>
-          </p:nvPr>
-        </p:nvSpPr>
-        <p:spPr>
-          <a:xfrm>
-            <a:off x="839788" y="457200"/>
-            <a:ext cx="3932237" cy="1600200"/>
-          </a:xfrm>
-        </p:spPr>
-        <p:txBody>
-          <a:bodyPr anchor="b"/>
-          <a:lstStyle>
-            <a:lvl1pPr>
-              <a:defRPr sz="3200"/>
-            </a:lvl1pPr>
-          </a:lstStyle>
-          <a:p>
-            <a:r>
-              <a:rPr lang="ko-KR" altLang="en-US"/>
-              <a:t>마스터 제목 스타일 편집</a:t>
-            </a:r>
-          </a:p>
-        </p:txBody>
-      </p:sp>
-      <p:sp>
-        <p:nvSpPr>
-          <p:cNvPr id="3" name="그림 개체 틀 2">
-            <a:extLst>
-              <a:ext uri="{FF2B5EF4-FFF2-40B4-BE49-F238E27FC236}">
-                <a16:creationId xmlns:a16="http://schemas.microsoft.com/office/drawing/2014/main" id="{986C31F9-3A2A-2391-76F1-D9DA129FB189}"/>
-              </a:ext>
-            </a:extLst>
-          </p:cNvPr>
-          <p:cNvSpPr>
-            <a:spLocks noGrp="1"/>
-          </p:cNvSpPr>
-          <p:nvPr>
-            <p:ph type="pic" idx="1"/>
-          </p:nvPr>
-        </p:nvSpPr>
-        <p:spPr>
-          <a:xfrm>
-            <a:off x="5183188" y="987425"/>
-            <a:ext cx="6172200" cy="4873625"/>
-          </a:xfrm>
-        </p:spPr>
-        <p:txBody>
-          <a:bodyPr/>
-          <a:lstStyle>
-            <a:lvl1pPr marL="0" indent="0">
-              <a:buNone/>
-              <a:defRPr sz="3200"/>
-            </a:lvl1pPr>
-            <a:lvl2pPr marL="457200" indent="0">
-              <a:buNone/>
-              <a:defRPr sz="2800"/>
-            </a:lvl2pPr>
-            <a:lvl3pPr marL="914400" indent="0">
-              <a:buNone/>
-              <a:defRPr sz="2400"/>
-            </a:lvl3pPr>
-            <a:lvl4pPr marL="1371600" indent="0">
-              <a:buNone/>
-              <a:defRPr sz="2000"/>
-            </a:lvl4pPr>
-            <a:lvl5pPr marL="1828800" indent="0">
-              <a:buNone/>
-              <a:defRPr sz="2000"/>
-            </a:lvl5pPr>
-            <a:lvl6pPr marL="2286000" indent="0">
-              <a:buNone/>
-              <a:defRPr sz="2000"/>
-            </a:lvl6pPr>
-            <a:lvl7pPr marL="2743200" indent="0">
-              <a:buNone/>
-              <a:defRPr sz="2000"/>
-            </a:lvl7pPr>
-            <a:lvl8pPr marL="3200400" indent="0">
-              <a:buNone/>
-              <a:defRPr sz="2000"/>
-            </a:lvl8pPr>
-            <a:lvl9pPr marL="3657600" indent="0">
-              <a:buNone/>
-              <a:defRPr sz="2000"/>
-            </a:lvl9pPr>
-          </a:lstStyle>
-          <a:p>
-            <a:endParaRPr lang="ko-KR" altLang="en-US"/>
-          </a:p>
-        </p:txBody>
-      </p:sp>
-      <p:sp>
-        <p:nvSpPr>
-          <p:cNvPr id="4" name="텍스트 개체 틀 3">
-            <a:extLst>
-              <a:ext uri="{FF2B5EF4-FFF2-40B4-BE49-F238E27FC236}">
-                <a16:creationId xmlns:a16="http://schemas.microsoft.com/office/drawing/2014/main" id="{14B52774-3348-7934-CE6B-562631011540}"/>
-              </a:ext>
-            </a:extLst>
-          </p:cNvPr>
-          <p:cNvSpPr>
-            <a:spLocks noGrp="1"/>
-          </p:cNvSpPr>
-          <p:nvPr>
-            <p:ph type="body" sz="half" idx="2"/>
-          </p:nvPr>
-        </p:nvSpPr>
-        <p:spPr>
-          <a:xfrm>
-            <a:off x="839788" y="2057400"/>
-            <a:ext cx="3932237" cy="3811588"/>
-          </a:xfrm>
-        </p:spPr>
-        <p:txBody>
-          <a:bodyPr/>
-          <a:lstStyle>
-            <a:lvl1pPr marL="0" indent="0">
-              <a:buNone/>
-              <a:defRPr sz="1600"/>
-            </a:lvl1pPr>
-            <a:lvl2pPr marL="457200" indent="0">
-              <a:buNone/>
-              <a:defRPr sz="1400"/>
-            </a:lvl2pPr>
-            <a:lvl3pPr marL="914400" indent="0">
-              <a:buNone/>
-              <a:defRPr sz="1200"/>
-            </a:lvl3pPr>
-            <a:lvl4pPr marL="1371600" indent="0">
-              <a:buNone/>
-              <a:defRPr sz="1000"/>
-            </a:lvl4pPr>
-            <a:lvl5pPr marL="1828800" indent="0">
-              <a:buNone/>
-              <a:defRPr sz="1000"/>
-            </a:lvl5pPr>
-            <a:lvl6pPr marL="2286000" indent="0">
-              <a:buNone/>
-              <a:defRPr sz="1000"/>
-            </a:lvl6pPr>
-            <a:lvl7pPr marL="2743200" indent="0">
-              <a:buNone/>
-              <a:defRPr sz="1000"/>
-            </a:lvl7pPr>
-            <a:lvl8pPr marL="3200400" indent="0">
-              <a:buNone/>
-              <a:defRPr sz="1000"/>
-            </a:lvl8pPr>
-            <a:lvl9pPr marL="3657600" indent="0">
-              <a:buNone/>
-              <a:defRPr sz="1000"/>
-            </a:lvl9pPr>
-          </a:lstStyle>
-          <a:p>
-            <a:pPr lvl="0"/>
-            <a:r>
-              <a:rPr lang="ko-KR" altLang="en-US"/>
-              <a:t>마스터 텍스트 스타일을 편집하려면 클릭</a:t>
-            </a:r>
-          </a:p>
-        </p:txBody>
-      </p:sp>
-      <p:sp>
-        <p:nvSpPr>
-          <p:cNvPr id="5" name="날짜 개체 틀 4">
-            <a:extLst>
-              <a:ext uri="{FF2B5EF4-FFF2-40B4-BE49-F238E27FC236}">
-                <a16:creationId xmlns:a16="http://schemas.microsoft.com/office/drawing/2014/main" id="{3A35A306-CF6B-2035-ACB3-449DBD27EB37}"/>
-              </a:ext>
-            </a:extLst>
-          </p:cNvPr>
-          <p:cNvSpPr>
-            <a:spLocks noGrp="1"/>
-          </p:cNvSpPr>
-          <p:nvPr>
-            <p:ph type="dt" sz="half" idx="10"/>
-          </p:nvPr>
-        </p:nvSpPr>
-        <p:spPr/>
-        <p:txBody>
-          <a:bodyPr/>
-          <a:lstStyle/>
-          <a:p>
-            <a:fld id="{89A6ECC6-FDDA-4013-8A7A-C99132F3B33E}" type="datetimeFigureOut">
-              <a:rPr lang="ko-KR" altLang="en-US" smtClean="0"/>
-              <a:t>2024-08-03</a:t>
-            </a:fld>
-            <a:endParaRPr lang="ko-KR" altLang="en-US"/>
-          </a:p>
-        </p:txBody>
-      </p:sp>
-      <p:sp>
-        <p:nvSpPr>
-          <p:cNvPr id="6" name="바닥글 개체 틀 5">
-            <a:extLst>
-              <a:ext uri="{FF2B5EF4-FFF2-40B4-BE49-F238E27FC236}">
-                <a16:creationId xmlns:a16="http://schemas.microsoft.com/office/drawing/2014/main" id="{E5C5E1B7-87D4-EDC1-6E8B-B6322524FCE0}"/>
-              </a:ext>
-            </a:extLst>
-          </p:cNvPr>
-          <p:cNvSpPr>
-            <a:spLocks noGrp="1"/>
-          </p:cNvSpPr>
-          <p:nvPr>
-            <p:ph type="ftr" sz="quarter" idx="11"/>
-          </p:nvPr>
-        </p:nvSpPr>
-        <p:spPr/>
-        <p:txBody>
-          <a:bodyPr/>
-          <a:lstStyle/>
-          <a:p>
-            <a:endParaRPr lang="ko-KR" altLang="en-US"/>
-          </a:p>
-        </p:txBody>
-      </p:sp>
-      <p:sp>
-        <p:nvSpPr>
-          <p:cNvPr id="7" name="슬라이드 번호 개체 틀 6">
-            <a:extLst>
-              <a:ext uri="{FF2B5EF4-FFF2-40B4-BE49-F238E27FC236}">
-                <a16:creationId xmlns:a16="http://schemas.microsoft.com/office/drawing/2014/main" id="{20A4EDF3-3092-4C14-F9DB-0C784E288F19}"/>
-              </a:ext>
-            </a:extLst>
-          </p:cNvPr>
-          <p:cNvSpPr>
-            <a:spLocks noGrp="1"/>
-          </p:cNvSpPr>
-          <p:nvPr>
-            <p:ph type="sldNum" sz="quarter" idx="12"/>
-          </p:nvPr>
-        </p:nvSpPr>
-        <p:spPr/>
-        <p:txBody>
-          <a:bodyPr/>
-          <a:lstStyle/>
-          <a:p>
-            <a:fld id="{8BB06AED-F636-4F75-B2CC-55ED5FB6B1EF}" type="slidenum">
-              <a:rPr lang="ko-KR" altLang="en-US" smtClean="0"/>
-              <a:t>‹#›</a:t>
-            </a:fld>
-            <a:endParaRPr lang="ko-KR" altLang="en-US"/>
-          </a:p>
-        </p:txBody>
-      </p:sp>
-    </p:spTree>
-    <p:extLst>
-      <p:ext uri="{BB962C8B-B14F-4D97-AF65-F5344CB8AC3E}">
-        <p14:creationId xmlns:p14="http://schemas.microsoft.com/office/powerpoint/2010/main" val="732431397"/>
       </p:ext>
     </p:extLst>
   </p:cSld>
@@ -2991,7 +3237,7 @@
             <a:fld id="{89A6ECC6-FDDA-4013-8A7A-C99132F3B33E}" type="datetimeFigureOut">
               <a:rPr lang="ko-KR" altLang="en-US" smtClean="0"/>
               <a:pPr/>
-              <a:t>2024-08-03</a:t>
+              <a:t>2024-08-04</a:t>
             </a:fld>
             <a:endParaRPr lang="ko-KR" altLang="en-US"/>
           </a:p>
@@ -3105,15 +3351,16 @@
   <p:sldLayoutIdLst>
     <p:sldLayoutId id="2147483649" r:id="rId1"/>
     <p:sldLayoutId id="2147483650" r:id="rId2"/>
-    <p:sldLayoutId id="2147483651" r:id="rId3"/>
-    <p:sldLayoutId id="2147483652" r:id="rId4"/>
-    <p:sldLayoutId id="2147483653" r:id="rId5"/>
-    <p:sldLayoutId id="2147483654" r:id="rId6"/>
-    <p:sldLayoutId id="2147483655" r:id="rId7"/>
-    <p:sldLayoutId id="2147483656" r:id="rId8"/>
-    <p:sldLayoutId id="2147483657" r:id="rId9"/>
-    <p:sldLayoutId id="2147483658" r:id="rId10"/>
-    <p:sldLayoutId id="2147483659" r:id="rId11"/>
+    <p:sldLayoutId id="2147483660" r:id="rId3"/>
+    <p:sldLayoutId id="2147483661" r:id="rId4"/>
+    <p:sldLayoutId id="2147483652" r:id="rId5"/>
+    <p:sldLayoutId id="2147483653" r:id="rId6"/>
+    <p:sldLayoutId id="2147483654" r:id="rId7"/>
+    <p:sldLayoutId id="2147483655" r:id="rId8"/>
+    <p:sldLayoutId id="2147483656" r:id="rId9"/>
+    <p:sldLayoutId id="2147483657" r:id="rId10"/>
+    <p:sldLayoutId id="2147483658" r:id="rId11"/>
+    <p:sldLayoutId id="2147483659" r:id="rId12"/>
   </p:sldLayoutIdLst>
   <p:txStyles>
     <p:titleStyle>
@@ -3438,23 +3685,7 @@
           <a:p>
             <a:r>
               <a:rPr lang="en-US" altLang="ko-KR" dirty="0"/>
-              <a:t>MCU_3</a:t>
-            </a:r>
-            <a:r>
-              <a:rPr lang="ko-KR" altLang="en-US" dirty="0"/>
-              <a:t>일차</a:t>
-            </a:r>
-            <a:r>
-              <a:rPr lang="en-US" altLang="ko-KR" dirty="0"/>
-              <a:t>_UART_</a:t>
-            </a:r>
-            <a:r>
-              <a:rPr lang="ko-KR" altLang="en-US" dirty="0"/>
-              <a:t>과제</a:t>
-            </a:r>
-            <a:r>
-              <a:rPr lang="en-US" altLang="ko-KR" dirty="0"/>
-              <a:t>1</a:t>
+              <a:t>Title</a:t>
             </a:r>
             <a:endParaRPr lang="ko-KR" altLang="en-US" dirty="0"/>
           </a:p>
@@ -3808,6 +4039,38 @@
     </a:fmtScheme>
   </a:themeElements>
   <a:objectDefaults>
+    <a:spDef>
+      <a:spPr>
+        <a:solidFill>
+          <a:srgbClr val="781D2C"/>
+        </a:solidFill>
+        <a:ln>
+          <a:noFill/>
+        </a:ln>
+      </a:spPr>
+      <a:bodyPr rtlCol="0" anchor="ctr"/>
+      <a:lstStyle>
+        <a:defPPr algn="ctr">
+          <a:defRPr dirty="0"/>
+        </a:defPPr>
+      </a:lstStyle>
+      <a:style>
+        <a:lnRef idx="2">
+          <a:schemeClr val="accent1">
+            <a:shade val="15000"/>
+          </a:schemeClr>
+        </a:lnRef>
+        <a:fillRef idx="1">
+          <a:schemeClr val="accent1"/>
+        </a:fillRef>
+        <a:effectRef idx="0">
+          <a:schemeClr val="accent1"/>
+        </a:effectRef>
+        <a:fontRef idx="minor">
+          <a:schemeClr val="lt1"/>
+        </a:fontRef>
+      </a:style>
+    </a:spDef>
     <a:lnDef>
       <a:spPr/>
       <a:bodyPr/>

</xml_diff>